<commit_message>
update knitr code chunk options
</commit_message>
<xml_diff>
--- a/docs/gallery/outputs/slides/powerpoint_presentation.pptx
+++ b/docs/gallery/outputs/slides/powerpoint_presentation.pptx
@@ -13,9 +13,6 @@
     <p:sldId id="261" r:id="rId7"/>
     <p:sldId id="262" r:id="rId8"/>
     <p:sldId id="263" r:id="rId9"/>
-    <p:sldId id="264" r:id="rId10"/>
-    <p:sldId id="265" r:id="rId11"/>
-    <p:sldId id="266" r:id="rId12"/>
   </p:sldIdLst>
   <p:sldSz cx="9144000" cy="6858000" type="screen4x3"/>
   <p:notesSz cx="6858000" cy="9144000"/>
@@ -3222,7 +3219,554 @@
 </p:sld>
 </file>
 
-<file path=ppt/slides/slide10.xml><?xml version="1.0" encoding="utf-8"?>
+<file path=ppt/slides/slide2.xml><?xml version="1.0" encoding="utf-8"?>
+<p:sld xmlns:a="http://schemas.openxmlformats.org/drawingml/2006/main" xmlns:r="http://schemas.openxmlformats.org/officeDocument/2006/relationships" xmlns:p="http://schemas.openxmlformats.org/presentationml/2006/main">
+  <p:cSld>
+    <p:spTree>
+      <p:nvGrpSpPr>
+        <p:cNvPr id="1" name=""/>
+        <p:cNvGrpSpPr/>
+        <p:nvPr/>
+      </p:nvGrpSpPr>
+      <p:grpSpPr>
+        <a:xfrm>
+          <a:off x="0" y="0"/>
+          <a:ext cx="0" cy="0"/>
+          <a:chOff x="0" y="0"/>
+          <a:chExt cx="0" cy="0"/>
+        </a:xfrm>
+      </p:grpSpPr>
+      <p:sp>
+        <p:nvSpPr>
+          <p:cNvPr id="2" name="Title 1"/>
+          <p:cNvSpPr>
+            <a:spLocks noGrp="1"/>
+          </p:cNvSpPr>
+          <p:nvPr>
+            <p:ph type="title"/>
+          </p:nvPr>
+        </p:nvSpPr>
+        <p:spPr/>
+        <p:txBody>
+          <a:bodyPr/>
+          <a:lstStyle/>
+          <a:p>
+            <a:pPr lvl="0" marL="0" indent="0">
+              <a:buNone/>
+            </a:pPr>
+            <a:r>
+              <a:rPr/>
+              <a:t>Packages</a:t>
+            </a:r>
+            <a:r>
+              <a:rPr/>
+              <a:t> </a:t>
+            </a:r>
+            <a:r>
+              <a:rPr/>
+              <a:t>and</a:t>
+            </a:r>
+            <a:r>
+              <a:rPr/>
+              <a:t> </a:t>
+            </a:r>
+            <a:r>
+              <a:rPr/>
+              <a:t>data</a:t>
+            </a:r>
+          </a:p>
+        </p:txBody>
+      </p:sp>
+      <p:sp>
+        <p:nvSpPr>
+          <p:cNvPr id="3" name="Content Placeholder 2"/>
+          <p:cNvSpPr>
+            <a:spLocks noGrp="1"/>
+          </p:cNvSpPr>
+          <p:nvPr>
+            <p:ph idx="1"/>
+          </p:nvPr>
+        </p:nvSpPr>
+        <p:spPr/>
+        <p:txBody>
+          <a:bodyPr/>
+          <a:lstStyle/>
+          <a:p>
+            <a:pPr lvl="0" marL="0" indent="0">
+              <a:buNone/>
+            </a:pPr>
+            <a:r>
+              <a:rPr/>
+              <a:t>The </a:t>
+            </a:r>
+            <a:r>
+              <a:rPr sz="1800">
+                <a:latin typeface="Courier"/>
+              </a:rPr>
+              <a:t>txhousing</a:t>
+            </a:r>
+            <a:r>
+              <a:rPr/>
+              <a:t> data is available when you install and load the </a:t>
+            </a:r>
+            <a:r>
+              <a:rPr sz="1800">
+                <a:latin typeface="Courier"/>
+              </a:rPr>
+              <a:t>ggplot2</a:t>
+            </a:r>
+            <a:r>
+              <a:rPr/>
+              <a:t> package.</a:t>
+            </a:r>
+          </a:p>
+        </p:txBody>
+      </p:sp>
+    </p:spTree>
+  </p:cSld>
+</p:sld>
+</file>
+
+<file path=ppt/slides/slide3.xml><?xml version="1.0" encoding="utf-8"?>
+<p:sld xmlns:a="http://schemas.openxmlformats.org/drawingml/2006/main" xmlns:r="http://schemas.openxmlformats.org/officeDocument/2006/relationships" xmlns:p="http://schemas.openxmlformats.org/presentationml/2006/main">
+  <p:cSld>
+    <p:spTree>
+      <p:nvGrpSpPr>
+        <p:cNvPr id="1" name=""/>
+        <p:cNvGrpSpPr/>
+        <p:nvPr/>
+      </p:nvGrpSpPr>
+      <p:grpSpPr>
+        <a:xfrm>
+          <a:off x="0" y="0"/>
+          <a:ext cx="0" cy="0"/>
+          <a:chOff x="0" y="0"/>
+          <a:chExt cx="0" cy="0"/>
+        </a:xfrm>
+      </p:grpSpPr>
+      <p:sp>
+        <p:nvSpPr>
+          <p:cNvPr id="2" name="Title 1"/>
+          <p:cNvSpPr>
+            <a:spLocks noGrp="1"/>
+          </p:cNvSpPr>
+          <p:nvPr>
+            <p:ph type="title"/>
+          </p:nvPr>
+        </p:nvSpPr>
+        <p:spPr/>
+        <p:txBody>
+          <a:bodyPr/>
+          <a:lstStyle/>
+          <a:p>
+            <a:pPr lvl="0" marL="0" indent="0">
+              <a:buNone/>
+            </a:pPr>
+            <a:r>
+              <a:rPr/>
+              <a:t>Austin</a:t>
+            </a:r>
+            <a:r>
+              <a:rPr/>
+              <a:t> </a:t>
+            </a:r>
+            <a:r>
+              <a:rPr/>
+              <a:t>is</a:t>
+            </a:r>
+            <a:r>
+              <a:rPr/>
+              <a:t> </a:t>
+            </a:r>
+            <a:r>
+              <a:rPr/>
+              <a:t>expensive</a:t>
+            </a:r>
+          </a:p>
+        </p:txBody>
+      </p:sp>
+      <p:pic>
+        <p:nvPicPr>
+          <p:cNvPr descr="/Users/alison/rprojs/rmd-render-factory/gallery/outputs/slides/powerpoint_presentation_files/figure-pptx/unnamed-chunk-2-1.png" id="0" name="Picture 1"/>
+          <p:cNvPicPr>
+            <a:picLocks noGrp="1" noChangeAspect="1"/>
+          </p:cNvPicPr>
+          <p:nvPr/>
+        </p:nvPicPr>
+        <p:blipFill>
+          <a:blip r:embed="rId2"/>
+          <a:stretch>
+            <a:fillRect/>
+          </a:stretch>
+        </p:blipFill>
+        <p:spPr bwMode="auto">
+          <a:xfrm>
+            <a:off x="1752600" y="1600200"/>
+            <a:ext cx="5651500" cy="4521200"/>
+          </a:xfrm>
+          <a:prstGeom prst="rect">
+            <a:avLst/>
+          </a:prstGeom>
+          <a:noFill/>
+          <a:ln w="9525">
+            <a:noFill/>
+            <a:headEnd/>
+            <a:tailEnd/>
+          </a:ln>
+        </p:spPr>
+      </p:pic>
+    </p:spTree>
+  </p:cSld>
+</p:sld>
+</file>
+
+<file path=ppt/slides/slide4.xml><?xml version="1.0" encoding="utf-8"?>
+<p:sld xmlns:a="http://schemas.openxmlformats.org/drawingml/2006/main" xmlns:r="http://schemas.openxmlformats.org/officeDocument/2006/relationships" xmlns:p="http://schemas.openxmlformats.org/presentationml/2006/main">
+  <p:cSld>
+    <p:spTree>
+      <p:nvGrpSpPr>
+        <p:cNvPr id="1" name=""/>
+        <p:cNvGrpSpPr/>
+        <p:nvPr/>
+      </p:nvGrpSpPr>
+      <p:grpSpPr>
+        <a:xfrm>
+          <a:off x="0" y="0"/>
+          <a:ext cx="0" cy="0"/>
+          <a:chOff x="0" y="0"/>
+          <a:chExt cx="0" cy="0"/>
+        </a:xfrm>
+      </p:grpSpPr>
+      <p:sp>
+        <p:nvSpPr>
+          <p:cNvPr id="2" name="Title 1"/>
+          <p:cNvSpPr>
+            <a:spLocks noGrp="1"/>
+          </p:cNvSpPr>
+          <p:nvPr>
+            <p:ph type="title"/>
+          </p:nvPr>
+        </p:nvSpPr>
+        <p:spPr/>
+        <p:txBody>
+          <a:bodyPr/>
+          <a:lstStyle/>
+          <a:p>
+            <a:pPr lvl="0" marL="0" indent="0">
+              <a:buNone/>
+            </a:pPr>
+            <a:r>
+              <a:rPr/>
+              <a:t>Austin</a:t>
+            </a:r>
+            <a:r>
+              <a:rPr/>
+              <a:t> </a:t>
+            </a:r>
+            <a:r>
+              <a:rPr/>
+              <a:t>prices</a:t>
+            </a:r>
+            <a:r>
+              <a:rPr/>
+              <a:t> </a:t>
+            </a:r>
+            <a:r>
+              <a:rPr/>
+              <a:t>on</a:t>
+            </a:r>
+            <a:r>
+              <a:rPr/>
+              <a:t> </a:t>
+            </a:r>
+            <a:r>
+              <a:rPr/>
+              <a:t>the</a:t>
+            </a:r>
+            <a:r>
+              <a:rPr/>
+              <a:t> </a:t>
+            </a:r>
+            <a:r>
+              <a:rPr/>
+              <a:t>rise</a:t>
+            </a:r>
+          </a:p>
+        </p:txBody>
+      </p:sp>
+      <p:pic>
+        <p:nvPicPr>
+          <p:cNvPr descr="/Users/alison/rprojs/rmd-render-factory/gallery/outputs/slides/powerpoint_presentation_files/figure-pptx/unnamed-chunk-3-1.png" id="0" name="Picture 1"/>
+          <p:cNvPicPr>
+            <a:picLocks noGrp="1" noChangeAspect="1"/>
+          </p:cNvPicPr>
+          <p:nvPr/>
+        </p:nvPicPr>
+        <p:blipFill>
+          <a:blip r:embed="rId2"/>
+          <a:stretch>
+            <a:fillRect/>
+          </a:stretch>
+        </p:blipFill>
+        <p:spPr bwMode="auto">
+          <a:xfrm>
+            <a:off x="1752600" y="1600200"/>
+            <a:ext cx="5651500" cy="4521200"/>
+          </a:xfrm>
+          <a:prstGeom prst="rect">
+            <a:avLst/>
+          </a:prstGeom>
+          <a:noFill/>
+          <a:ln w="9525">
+            <a:noFill/>
+            <a:headEnd/>
+            <a:tailEnd/>
+          </a:ln>
+        </p:spPr>
+      </p:pic>
+    </p:spTree>
+  </p:cSld>
+</p:sld>
+</file>
+
+<file path=ppt/slides/slide5.xml><?xml version="1.0" encoding="utf-8"?>
+<p:sld xmlns:a="http://schemas.openxmlformats.org/drawingml/2006/main" xmlns:r="http://schemas.openxmlformats.org/officeDocument/2006/relationships" xmlns:p="http://schemas.openxmlformats.org/presentationml/2006/main">
+  <p:cSld>
+    <p:spTree>
+      <p:nvGrpSpPr>
+        <p:cNvPr id="1" name=""/>
+        <p:cNvGrpSpPr/>
+        <p:nvPr/>
+      </p:nvGrpSpPr>
+      <p:grpSpPr>
+        <a:xfrm>
+          <a:off x="0" y="0"/>
+          <a:ext cx="0" cy="0"/>
+          <a:chOff x="0" y="0"/>
+          <a:chExt cx="0" cy="0"/>
+        </a:xfrm>
+      </p:grpSpPr>
+      <p:sp>
+        <p:nvSpPr>
+          <p:cNvPr id="2" name="Title 1"/>
+          <p:cNvSpPr>
+            <a:spLocks noGrp="1"/>
+          </p:cNvSpPr>
+          <p:nvPr>
+            <p:ph type="title"/>
+          </p:nvPr>
+        </p:nvSpPr>
+        <p:spPr/>
+        <p:txBody>
+          <a:bodyPr/>
+          <a:lstStyle/>
+          <a:p>
+            <a:pPr lvl="0" marL="0" indent="0">
+              <a:buNone/>
+            </a:pPr>
+            <a:r>
+              <a:rPr/>
+              <a:t>Fort</a:t>
+            </a:r>
+            <a:r>
+              <a:rPr/>
+              <a:t> </a:t>
+            </a:r>
+            <a:r>
+              <a:rPr/>
+              <a:t>Worth</a:t>
+            </a:r>
+            <a:r>
+              <a:rPr/>
+              <a:t> </a:t>
+            </a:r>
+            <a:r>
+              <a:rPr/>
+              <a:t>has</a:t>
+            </a:r>
+            <a:r>
+              <a:rPr/>
+              <a:t> </a:t>
+            </a:r>
+            <a:r>
+              <a:rPr/>
+              <a:t>more</a:t>
+            </a:r>
+            <a:r>
+              <a:rPr/>
+              <a:t> </a:t>
+            </a:r>
+            <a:r>
+              <a:rPr/>
+              <a:t>affordable</a:t>
+            </a:r>
+            <a:r>
+              <a:rPr/>
+              <a:t> </a:t>
+            </a:r>
+            <a:r>
+              <a:rPr/>
+              <a:t>housing</a:t>
+            </a:r>
+          </a:p>
+        </p:txBody>
+      </p:sp>
+      <p:pic>
+        <p:nvPicPr>
+          <p:cNvPr descr="/Users/alison/rprojs/rmd-render-factory/gallery/outputs/slides/powerpoint_presentation_files/figure-pptx/unnamed-chunk-4-1.png" id="0" name="Picture 1"/>
+          <p:cNvPicPr>
+            <a:picLocks noGrp="1" noChangeAspect="1"/>
+          </p:cNvPicPr>
+          <p:nvPr/>
+        </p:nvPicPr>
+        <p:blipFill>
+          <a:blip r:embed="rId2"/>
+          <a:stretch>
+            <a:fillRect/>
+          </a:stretch>
+        </p:blipFill>
+        <p:spPr bwMode="auto">
+          <a:xfrm>
+            <a:off x="1752600" y="1600200"/>
+            <a:ext cx="5651500" cy="4521200"/>
+          </a:xfrm>
+          <a:prstGeom prst="rect">
+            <a:avLst/>
+          </a:prstGeom>
+          <a:noFill/>
+          <a:ln w="9525">
+            <a:noFill/>
+            <a:headEnd/>
+            <a:tailEnd/>
+          </a:ln>
+        </p:spPr>
+      </p:pic>
+    </p:spTree>
+  </p:cSld>
+</p:sld>
+</file>
+
+<file path=ppt/slides/slide6.xml><?xml version="1.0" encoding="utf-8"?>
+<p:sld xmlns:a="http://schemas.openxmlformats.org/drawingml/2006/main" xmlns:r="http://schemas.openxmlformats.org/officeDocument/2006/relationships" xmlns:p="http://schemas.openxmlformats.org/presentationml/2006/main">
+  <p:cSld>
+    <p:spTree>
+      <p:nvGrpSpPr>
+        <p:cNvPr id="1" name=""/>
+        <p:cNvGrpSpPr/>
+        <p:nvPr/>
+      </p:nvGrpSpPr>
+      <p:grpSpPr>
+        <a:xfrm>
+          <a:off x="0" y="0"/>
+          <a:ext cx="0" cy="0"/>
+          <a:chOff x="0" y="0"/>
+          <a:chExt cx="0" cy="0"/>
+        </a:xfrm>
+      </p:grpSpPr>
+      <p:sp>
+        <p:nvSpPr>
+          <p:cNvPr id="2" name="Title 1"/>
+          <p:cNvSpPr>
+            <a:spLocks noGrp="1"/>
+          </p:cNvSpPr>
+          <p:nvPr>
+            <p:ph type="title"/>
+          </p:nvPr>
+        </p:nvSpPr>
+        <p:spPr/>
+        <p:txBody>
+          <a:bodyPr/>
+          <a:lstStyle/>
+          <a:p>
+            <a:pPr lvl="0" marL="0" indent="0">
+              <a:buNone/>
+            </a:pPr>
+            <a:r>
+              <a:rPr/>
+              <a:t>The</a:t>
+            </a:r>
+            <a:r>
+              <a:rPr/>
+              <a:t> </a:t>
+            </a:r>
+            <a:r>
+              <a:rPr/>
+              <a:t>current</a:t>
+            </a:r>
+            <a:r>
+              <a:rPr/>
+              <a:t> </a:t>
+            </a:r>
+            <a:r>
+              <a:rPr/>
+              <a:t>pace</a:t>
+            </a:r>
+            <a:r>
+              <a:rPr/>
+              <a:t> </a:t>
+            </a:r>
+            <a:r>
+              <a:rPr/>
+              <a:t>of</a:t>
+            </a:r>
+            <a:r>
+              <a:rPr/>
+              <a:t> </a:t>
+            </a:r>
+            <a:r>
+              <a:rPr/>
+              <a:t>sales</a:t>
+            </a:r>
+            <a:r>
+              <a:rPr/>
+              <a:t> </a:t>
+            </a:r>
+            <a:r>
+              <a:rPr/>
+              <a:t>is</a:t>
+            </a:r>
+            <a:r>
+              <a:rPr/>
+              <a:t> </a:t>
+            </a:r>
+            <a:r>
+              <a:rPr/>
+              <a:t>fast</a:t>
+            </a:r>
+          </a:p>
+        </p:txBody>
+      </p:sp>
+      <p:sp>
+        <p:nvSpPr>
+          <p:cNvPr id="3" name="Content Placeholder 2"/>
+          <p:cNvSpPr>
+            <a:spLocks noGrp="1"/>
+          </p:cNvSpPr>
+          <p:nvPr>
+            <p:ph idx="1"/>
+          </p:nvPr>
+        </p:nvSpPr>
+        <p:spPr/>
+        <p:txBody>
+          <a:bodyPr/>
+          <a:lstStyle/>
+          <a:p>
+            <a:pPr lvl="0" marL="0" indent="0">
+              <a:buNone/>
+            </a:pPr>
+            <a:r>
+              <a:rPr/>
+              <a:t>“Months inventory”: amount of time it would take to sell all current listings at current pace of sales.</a:t>
+            </a:r>
+          </a:p>
+        </p:txBody>
+      </p:sp>
+    </p:spTree>
+  </p:cSld>
+</p:sld>
+</file>
+
+<file path=ppt/slides/slide7.xml><?xml version="1.0" encoding="utf-8"?>
 <p:sld xmlns:a="http://schemas.openxmlformats.org/drawingml/2006/main" xmlns:r="http://schemas.openxmlformats.org/officeDocument/2006/relationships" xmlns:p="http://schemas.openxmlformats.org/presentationml/2006/main">
   <p:cSld>
     <p:spTree>
@@ -3274,1699 +3818,6 @@
 </p:sld>
 </file>
 
-<file path=ppt/slides/slide11.xml><?xml version="1.0" encoding="utf-8"?>
-<p:sld xmlns:a="http://schemas.openxmlformats.org/drawingml/2006/main" xmlns:r="http://schemas.openxmlformats.org/officeDocument/2006/relationships" xmlns:p="http://schemas.openxmlformats.org/presentationml/2006/main">
-  <p:cSld>
-    <p:spTree>
-      <p:nvGrpSpPr>
-        <p:cNvPr id="1" name=""/>
-        <p:cNvGrpSpPr/>
-        <p:nvPr/>
-      </p:nvGrpSpPr>
-      <p:grpSpPr>
-        <a:xfrm>
-          <a:off x="0" y="0"/>
-          <a:ext cx="0" cy="0"/>
-          <a:chOff x="0" y="0"/>
-          <a:chExt cx="0" cy="0"/>
-        </a:xfrm>
-      </p:grpSpPr>
-      <p:sp>
-        <p:nvSpPr>
-          <p:cNvPr id="2" name="Title 1"/>
-          <p:cNvSpPr>
-            <a:spLocks noGrp="1"/>
-          </p:cNvSpPr>
-          <p:nvPr>
-            <p:ph type="title"/>
-          </p:nvPr>
-        </p:nvSpPr>
-        <p:spPr/>
-        <p:txBody>
-          <a:bodyPr/>
-          <a:lstStyle/>
-          <a:p>
-            <a:pPr lvl="0" marL="0" indent="0">
-              <a:buNone/>
-            </a:pPr>
-            <a:r>
-              <a:rPr/>
-              <a:t>Thanks</a:t>
-            </a:r>
-            <a:r>
-              <a:rPr/>
-              <a:t> </a:t>
-            </a:r>
-            <a:r>
-              <a:rPr/>
-              <a:t>to…</a:t>
-            </a:r>
-          </a:p>
-        </p:txBody>
-      </p:sp>
-      <p:sp>
-        <p:nvSpPr>
-          <p:cNvPr id="3" name="Content Placeholder 2"/>
-          <p:cNvSpPr>
-            <a:spLocks noGrp="1"/>
-          </p:cNvSpPr>
-          <p:nvPr>
-            <p:ph idx="1"/>
-          </p:nvPr>
-        </p:nvSpPr>
-        <p:spPr/>
-        <p:txBody>
-          <a:bodyPr/>
-          <a:lstStyle/>
-          <a:p>
-            <a:pPr lvl="1"/>
-            <a:r>
-              <a:rPr/>
-              <a:t>Jennifer Thompson: </a:t>
-            </a:r>
-            <a:r>
-              <a:rPr>
-                <a:hlinkClick r:id="rId2"/>
-              </a:rPr>
-              <a:t>https://github.com/jenniferthompson/ParamRmdExample</a:t>
-            </a:r>
-          </a:p>
-          <a:p>
-            <a:pPr lvl="1"/>
-            <a:r>
-              <a:rPr/>
-              <a:t>Garrett Grolemund: </a:t>
-            </a:r>
-            <a:r>
-              <a:rPr>
-                <a:hlinkClick r:id="rId3"/>
-              </a:rPr>
-              <a:t>https://rmarkdown.rstudio.com/lesson-6.html</a:t>
-            </a:r>
-          </a:p>
-        </p:txBody>
-      </p:sp>
-    </p:spTree>
-  </p:cSld>
-</p:sld>
-</file>
-
-<file path=ppt/slides/slide2.xml><?xml version="1.0" encoding="utf-8"?>
-<p:sld xmlns:a="http://schemas.openxmlformats.org/drawingml/2006/main" xmlns:r="http://schemas.openxmlformats.org/officeDocument/2006/relationships" xmlns:p="http://schemas.openxmlformats.org/presentationml/2006/main">
-  <p:cSld>
-    <p:spTree>
-      <p:nvGrpSpPr>
-        <p:cNvPr id="1" name=""/>
-        <p:cNvGrpSpPr/>
-        <p:nvPr/>
-      </p:nvGrpSpPr>
-      <p:grpSpPr>
-        <a:xfrm>
-          <a:off x="0" y="0"/>
-          <a:ext cx="0" cy="0"/>
-          <a:chOff x="0" y="0"/>
-          <a:chExt cx="0" cy="0"/>
-        </a:xfrm>
-      </p:grpSpPr>
-      <p:sp>
-        <p:nvSpPr>
-          <p:cNvPr id="2" name="Title 1"/>
-          <p:cNvSpPr>
-            <a:spLocks noGrp="1"/>
-          </p:cNvSpPr>
-          <p:nvPr>
-            <p:ph type="title"/>
-          </p:nvPr>
-        </p:nvSpPr>
-        <p:spPr/>
-        <p:txBody>
-          <a:bodyPr/>
-          <a:lstStyle/>
-          <a:p>
-            <a:pPr lvl="0" marL="0" indent="0">
-              <a:buNone/>
-            </a:pPr>
-            <a:r>
-              <a:rPr/>
-              <a:t>Packages</a:t>
-            </a:r>
-            <a:r>
-              <a:rPr/>
-              <a:t> </a:t>
-            </a:r>
-            <a:r>
-              <a:rPr/>
-              <a:t>and</a:t>
-            </a:r>
-            <a:r>
-              <a:rPr/>
-              <a:t> </a:t>
-            </a:r>
-            <a:r>
-              <a:rPr/>
-              <a:t>data</a:t>
-            </a:r>
-          </a:p>
-        </p:txBody>
-      </p:sp>
-      <p:sp>
-        <p:nvSpPr>
-          <p:cNvPr id="3" name="Content Placeholder 2"/>
-          <p:cNvSpPr>
-            <a:spLocks noGrp="1"/>
-          </p:cNvSpPr>
-          <p:nvPr>
-            <p:ph idx="1"/>
-          </p:nvPr>
-        </p:nvSpPr>
-        <p:spPr/>
-        <p:txBody>
-          <a:bodyPr/>
-          <a:lstStyle/>
-          <a:p>
-            <a:pPr lvl="0" marL="0" indent="0">
-              <a:buNone/>
-            </a:pPr>
-            <a:r>
-              <a:rPr/>
-              <a:t>We’ll use </a:t>
-            </a:r>
-            <a:r>
-              <a:rPr sz="1800">
-                <a:latin typeface="Courier"/>
-              </a:rPr>
-              <a:t>ggplot2</a:t>
-            </a:r>
-            <a:r>
-              <a:rPr/>
-              <a:t> for visualization, and some light </a:t>
-            </a:r>
-            <a:r>
-              <a:rPr sz="1800">
-                <a:latin typeface="Courier"/>
-              </a:rPr>
-              <a:t>dplyr</a:t>
-            </a:r>
-            <a:r>
-              <a:rPr/>
-              <a:t> for data wrangling. The </a:t>
-            </a:r>
-            <a:r>
-              <a:rPr sz="1800">
-                <a:latin typeface="Courier"/>
-              </a:rPr>
-              <a:t>txhousing</a:t>
-            </a:r>
-            <a:r>
-              <a:rPr/>
-              <a:t> data is loaded for you when you install and load the </a:t>
-            </a:r>
-            <a:r>
-              <a:rPr sz="1800">
-                <a:latin typeface="Courier"/>
-              </a:rPr>
-              <a:t>ggplot2</a:t>
-            </a:r>
-            <a:r>
-              <a:rPr/>
-              <a:t> package.</a:t>
-            </a:r>
-          </a:p>
-          <a:p>
-            <a:pPr lvl="0" marL="1270000" indent="0">
-              <a:buNone/>
-            </a:pPr>
-            <a:r>
-              <a:rPr sz="1800" b="1">
-                <a:solidFill>
-                  <a:srgbClr val="007020"/>
-                </a:solidFill>
-                <a:latin typeface="Courier"/>
-              </a:rPr>
-              <a:t>library</a:t>
-            </a:r>
-            <a:r>
-              <a:rPr sz="1800">
-                <a:latin typeface="Courier"/>
-              </a:rPr>
-              <a:t>(ggplot2) </a:t>
-            </a:r>
-            <a:r>
-              <a:rPr sz="1800" i="1">
-                <a:solidFill>
-                  <a:srgbClr val="60A0B0"/>
-                </a:solidFill>
-                <a:latin typeface="Courier"/>
-              </a:rPr>
-              <a:t># plotting</a:t>
-            </a:r>
-            <a:br/>
-            <a:r>
-              <a:rPr sz="1800" b="1">
-                <a:solidFill>
-                  <a:srgbClr val="007020"/>
-                </a:solidFill>
-                <a:latin typeface="Courier"/>
-              </a:rPr>
-              <a:t>library</a:t>
-            </a:r>
-            <a:r>
-              <a:rPr sz="1800">
-                <a:latin typeface="Courier"/>
-              </a:rPr>
-              <a:t>(dplyr) </a:t>
-            </a:r>
-            <a:r>
-              <a:rPr sz="1800" i="1">
-                <a:solidFill>
-                  <a:srgbClr val="60A0B0"/>
-                </a:solidFill>
-                <a:latin typeface="Courier"/>
-              </a:rPr>
-              <a:t># wrangling</a:t>
-            </a:r>
-            <a:br/>
-            <a:r>
-              <a:rPr sz="1800">
-                <a:latin typeface="Courier"/>
-              </a:rPr>
-              <a:t>txsamp &lt;-</a:t>
-            </a:r>
-            <a:r>
-              <a:rPr sz="1800">
-                <a:solidFill>
-                  <a:srgbClr val="4070A0"/>
-                </a:solidFill>
-                <a:latin typeface="Courier"/>
-              </a:rPr>
-              <a:t> </a:t>
-            </a:r>
-            <a:r>
-              <a:rPr sz="1800">
-                <a:latin typeface="Courier"/>
-              </a:rPr>
-              <a:t>txhousing </a:t>
-            </a:r>
-            <a:r>
-              <a:rPr sz="1800">
-                <a:solidFill>
-                  <a:srgbClr val="666666"/>
-                </a:solidFill>
-                <a:latin typeface="Courier"/>
-              </a:rPr>
-              <a:t>%&gt;%</a:t>
-            </a:r>
-            <a:r>
-              <a:rPr sz="1800">
-                <a:solidFill>
-                  <a:srgbClr val="4070A0"/>
-                </a:solidFill>
-                <a:latin typeface="Courier"/>
-              </a:rPr>
-              <a:t> </a:t>
-            </a:r>
-            <a:br/>
-            <a:r>
-              <a:rPr sz="1800">
-                <a:solidFill>
-                  <a:srgbClr val="4070A0"/>
-                </a:solidFill>
-                <a:latin typeface="Courier"/>
-              </a:rPr>
-              <a:t>  </a:t>
-            </a:r>
-            <a:r>
-              <a:rPr sz="1800" b="1">
-                <a:solidFill>
-                  <a:srgbClr val="007020"/>
-                </a:solidFill>
-                <a:latin typeface="Courier"/>
-              </a:rPr>
-              <a:t>filter</a:t>
-            </a:r>
-            <a:r>
-              <a:rPr sz="1800">
-                <a:latin typeface="Courier"/>
-              </a:rPr>
-              <a:t>(city </a:t>
-            </a:r>
-            <a:r>
-              <a:rPr sz="1800">
-                <a:solidFill>
-                  <a:srgbClr val="666666"/>
-                </a:solidFill>
-                <a:latin typeface="Courier"/>
-              </a:rPr>
-              <a:t>%in%</a:t>
-            </a:r>
-            <a:r>
-              <a:rPr sz="1800">
-                <a:solidFill>
-                  <a:srgbClr val="4070A0"/>
-                </a:solidFill>
-                <a:latin typeface="Courier"/>
-              </a:rPr>
-              <a:t> </a:t>
-            </a:r>
-            <a:r>
-              <a:rPr sz="1800" b="1">
-                <a:solidFill>
-                  <a:srgbClr val="007020"/>
-                </a:solidFill>
-                <a:latin typeface="Courier"/>
-              </a:rPr>
-              <a:t>c</a:t>
-            </a:r>
-            <a:r>
-              <a:rPr sz="1800">
-                <a:latin typeface="Courier"/>
-              </a:rPr>
-              <a:t>(</a:t>
-            </a:r>
-            <a:r>
-              <a:rPr sz="1800">
-                <a:solidFill>
-                  <a:srgbClr val="4070A0"/>
-                </a:solidFill>
-                <a:latin typeface="Courier"/>
-              </a:rPr>
-              <a:t>"Houston"</a:t>
-            </a:r>
-            <a:r>
-              <a:rPr sz="1800">
-                <a:latin typeface="Courier"/>
-              </a:rPr>
-              <a:t>, </a:t>
-            </a:r>
-            <a:r>
-              <a:rPr sz="1800">
-                <a:solidFill>
-                  <a:srgbClr val="4070A0"/>
-                </a:solidFill>
-                <a:latin typeface="Courier"/>
-              </a:rPr>
-              <a:t>"Fort Worth"</a:t>
-            </a:r>
-            <a:r>
-              <a:rPr sz="1800">
-                <a:latin typeface="Courier"/>
-              </a:rPr>
-              <a:t>, </a:t>
-            </a:r>
-            <a:r>
-              <a:rPr sz="1800">
-                <a:solidFill>
-                  <a:srgbClr val="4070A0"/>
-                </a:solidFill>
-                <a:latin typeface="Courier"/>
-              </a:rPr>
-              <a:t>"San Antonio"</a:t>
-            </a:r>
-            <a:r>
-              <a:rPr sz="1800">
-                <a:latin typeface="Courier"/>
-              </a:rPr>
-              <a:t>, </a:t>
-            </a:r>
-            <a:r>
-              <a:rPr sz="1800">
-                <a:solidFill>
-                  <a:srgbClr val="4070A0"/>
-                </a:solidFill>
-                <a:latin typeface="Courier"/>
-              </a:rPr>
-              <a:t>"Dallas"</a:t>
-            </a:r>
-            <a:r>
-              <a:rPr sz="1800">
-                <a:latin typeface="Courier"/>
-              </a:rPr>
-              <a:t>, </a:t>
-            </a:r>
-            <a:r>
-              <a:rPr sz="1800">
-                <a:solidFill>
-                  <a:srgbClr val="4070A0"/>
-                </a:solidFill>
-                <a:latin typeface="Courier"/>
-              </a:rPr>
-              <a:t>"Austin"</a:t>
-            </a:r>
-            <a:r>
-              <a:rPr sz="1800">
-                <a:latin typeface="Courier"/>
-              </a:rPr>
-              <a:t>))</a:t>
-            </a:r>
-          </a:p>
-        </p:txBody>
-      </p:sp>
-    </p:spTree>
-  </p:cSld>
-</p:sld>
-</file>
-
-<file path=ppt/slides/slide3.xml><?xml version="1.0" encoding="utf-8"?>
-<p:sld xmlns:a="http://schemas.openxmlformats.org/drawingml/2006/main" xmlns:r="http://schemas.openxmlformats.org/officeDocument/2006/relationships" xmlns:p="http://schemas.openxmlformats.org/presentationml/2006/main">
-  <p:cSld>
-    <p:spTree>
-      <p:nvGrpSpPr>
-        <p:cNvPr id="1" name=""/>
-        <p:cNvGrpSpPr/>
-        <p:nvPr/>
-      </p:nvGrpSpPr>
-      <p:grpSpPr>
-        <a:xfrm>
-          <a:off x="0" y="0"/>
-          <a:ext cx="0" cy="0"/>
-          <a:chOff x="0" y="0"/>
-          <a:chExt cx="0" cy="0"/>
-        </a:xfrm>
-      </p:grpSpPr>
-      <p:sp>
-        <p:nvSpPr>
-          <p:cNvPr id="2" name="Title 1"/>
-          <p:cNvSpPr>
-            <a:spLocks noGrp="1"/>
-          </p:cNvSpPr>
-          <p:nvPr>
-            <p:ph type="title"/>
-          </p:nvPr>
-        </p:nvSpPr>
-        <p:spPr/>
-        <p:txBody>
-          <a:bodyPr/>
-          <a:lstStyle/>
-          <a:p>
-            <a:pPr lvl="0" marL="0" indent="0">
-              <a:buNone/>
-            </a:pPr>
-            <a:r>
-              <a:rPr/>
-              <a:t>Austin</a:t>
-            </a:r>
-            <a:r>
-              <a:rPr/>
-              <a:t> </a:t>
-            </a:r>
-            <a:r>
-              <a:rPr/>
-              <a:t>is</a:t>
-            </a:r>
-            <a:r>
-              <a:rPr/>
-              <a:t> </a:t>
-            </a:r>
-            <a:r>
-              <a:rPr/>
-              <a:t>expensive</a:t>
-            </a:r>
-          </a:p>
-        </p:txBody>
-      </p:sp>
-      <p:sp>
-        <p:nvSpPr>
-          <p:cNvPr id="3" name="Content Placeholder 2"/>
-          <p:cNvSpPr>
-            <a:spLocks noGrp="1"/>
-          </p:cNvSpPr>
-          <p:nvPr>
-            <p:ph idx="1"/>
-          </p:nvPr>
-        </p:nvSpPr>
-        <p:spPr/>
-        <p:txBody>
-          <a:bodyPr/>
-          <a:lstStyle/>
-          <a:p>
-            <a:pPr lvl="0" marL="1270000" indent="0">
-              <a:buNone/>
-            </a:pPr>
-            <a:r>
-              <a:rPr sz="1800" b="1">
-                <a:solidFill>
-                  <a:srgbClr val="007020"/>
-                </a:solidFill>
-                <a:latin typeface="Courier"/>
-              </a:rPr>
-              <a:t>ggplot</a:t>
-            </a:r>
-            <a:r>
-              <a:rPr sz="1800">
-                <a:latin typeface="Courier"/>
-              </a:rPr>
-              <a:t>(</a:t>
-            </a:r>
-            <a:r>
-              <a:rPr sz="1800">
-                <a:solidFill>
-                  <a:srgbClr val="902000"/>
-                </a:solidFill>
-                <a:latin typeface="Courier"/>
-              </a:rPr>
-              <a:t>data =</a:t>
-            </a:r>
-            <a:r>
-              <a:rPr sz="1800">
-                <a:latin typeface="Courier"/>
-              </a:rPr>
-              <a:t> txsamp, </a:t>
-            </a:r>
-            <a:r>
-              <a:rPr sz="1800" b="1">
-                <a:solidFill>
-                  <a:srgbClr val="007020"/>
-                </a:solidFill>
-                <a:latin typeface="Courier"/>
-              </a:rPr>
-              <a:t>aes</a:t>
-            </a:r>
-            <a:r>
-              <a:rPr sz="1800">
-                <a:latin typeface="Courier"/>
-              </a:rPr>
-              <a:t>(</a:t>
-            </a:r>
-            <a:r>
-              <a:rPr sz="1800">
-                <a:solidFill>
-                  <a:srgbClr val="902000"/>
-                </a:solidFill>
-                <a:latin typeface="Courier"/>
-              </a:rPr>
-              <a:t>x =</a:t>
-            </a:r>
-            <a:r>
-              <a:rPr sz="1800">
-                <a:latin typeface="Courier"/>
-              </a:rPr>
-              <a:t> sales, </a:t>
-            </a:r>
-            <a:r>
-              <a:rPr sz="1800">
-                <a:solidFill>
-                  <a:srgbClr val="902000"/>
-                </a:solidFill>
-                <a:latin typeface="Courier"/>
-              </a:rPr>
-              <a:t>y =</a:t>
-            </a:r>
-            <a:r>
-              <a:rPr sz="1800">
-                <a:latin typeface="Courier"/>
-              </a:rPr>
-              <a:t> median)) </a:t>
-            </a:r>
-            <a:r>
-              <a:rPr sz="1800">
-                <a:solidFill>
-                  <a:srgbClr val="666666"/>
-                </a:solidFill>
-                <a:latin typeface="Courier"/>
-              </a:rPr>
-              <a:t>+</a:t>
-            </a:r>
-            <a:br/>
-            <a:r>
-              <a:rPr sz="1800">
-                <a:solidFill>
-                  <a:srgbClr val="4070A0"/>
-                </a:solidFill>
-                <a:latin typeface="Courier"/>
-              </a:rPr>
-              <a:t>   </a:t>
-            </a:r>
-            <a:r>
-              <a:rPr sz="1800" b="1">
-                <a:solidFill>
-                  <a:srgbClr val="007020"/>
-                </a:solidFill>
-                <a:latin typeface="Courier"/>
-              </a:rPr>
-              <a:t>geom_point</a:t>
-            </a:r>
-            <a:r>
-              <a:rPr sz="1800">
-                <a:latin typeface="Courier"/>
-              </a:rPr>
-              <a:t>(</a:t>
-            </a:r>
-            <a:r>
-              <a:rPr sz="1800" b="1">
-                <a:solidFill>
-                  <a:srgbClr val="007020"/>
-                </a:solidFill>
-                <a:latin typeface="Courier"/>
-              </a:rPr>
-              <a:t>aes</a:t>
-            </a:r>
-            <a:r>
-              <a:rPr sz="1800">
-                <a:latin typeface="Courier"/>
-              </a:rPr>
-              <a:t>(</a:t>
-            </a:r>
-            <a:r>
-              <a:rPr sz="1800">
-                <a:solidFill>
-                  <a:srgbClr val="902000"/>
-                </a:solidFill>
-                <a:latin typeface="Courier"/>
-              </a:rPr>
-              <a:t>colour =</a:t>
-            </a:r>
-            <a:r>
-              <a:rPr sz="1800">
-                <a:latin typeface="Courier"/>
-              </a:rPr>
-              <a:t> city)) </a:t>
-            </a:r>
-            <a:r>
-              <a:rPr sz="1800">
-                <a:solidFill>
-                  <a:srgbClr val="666666"/>
-                </a:solidFill>
-                <a:latin typeface="Courier"/>
-              </a:rPr>
-              <a:t>+</a:t>
-            </a:r>
-            <a:r>
-              <a:rPr sz="1800">
-                <a:solidFill>
-                  <a:srgbClr val="4070A0"/>
-                </a:solidFill>
-                <a:latin typeface="Courier"/>
-              </a:rPr>
-              <a:t> </a:t>
-            </a:r>
-            <a:br/>
-            <a:r>
-              <a:rPr sz="1800">
-                <a:solidFill>
-                  <a:srgbClr val="4070A0"/>
-                </a:solidFill>
-                <a:latin typeface="Courier"/>
-              </a:rPr>
-              <a:t>   </a:t>
-            </a:r>
-            <a:r>
-              <a:rPr sz="1800" b="1">
-                <a:solidFill>
-                  <a:srgbClr val="007020"/>
-                </a:solidFill>
-                <a:latin typeface="Courier"/>
-              </a:rPr>
-              <a:t>scale_colour_viridis_d</a:t>
-            </a:r>
-            <a:r>
-              <a:rPr sz="1800">
-                <a:latin typeface="Courier"/>
-              </a:rPr>
-              <a:t>(</a:t>
-            </a:r>
-            <a:r>
-              <a:rPr sz="1800">
-                <a:solidFill>
-                  <a:srgbClr val="4070A0"/>
-                </a:solidFill>
-                <a:latin typeface="Courier"/>
-              </a:rPr>
-              <a:t>"City\nCenter"</a:t>
-            </a:r>
-            <a:r>
-              <a:rPr sz="1800">
-                <a:latin typeface="Courier"/>
-              </a:rPr>
-              <a:t>, </a:t>
-            </a:r>
-            <a:r>
-              <a:rPr sz="1800">
-                <a:solidFill>
-                  <a:srgbClr val="902000"/>
-                </a:solidFill>
-                <a:latin typeface="Courier"/>
-              </a:rPr>
-              <a:t>option =</a:t>
-            </a:r>
-            <a:r>
-              <a:rPr sz="1800">
-                <a:latin typeface="Courier"/>
-              </a:rPr>
-              <a:t> params</a:t>
-            </a:r>
-            <a:r>
-              <a:rPr sz="1800">
-                <a:solidFill>
-                  <a:srgbClr val="666666"/>
-                </a:solidFill>
-                <a:latin typeface="Courier"/>
-              </a:rPr>
-              <a:t>$</a:t>
-            </a:r>
-            <a:r>
-              <a:rPr sz="1800">
-                <a:latin typeface="Courier"/>
-              </a:rPr>
-              <a:t>viridis_palette)</a:t>
-            </a:r>
-          </a:p>
-        </p:txBody>
-      </p:sp>
-    </p:spTree>
-  </p:cSld>
-</p:sld>
-</file>
-
-<file path=ppt/slides/slide4.xml><?xml version="1.0" encoding="utf-8"?>
-<p:sld xmlns:a="http://schemas.openxmlformats.org/drawingml/2006/main" xmlns:r="http://schemas.openxmlformats.org/officeDocument/2006/relationships" xmlns:p="http://schemas.openxmlformats.org/presentationml/2006/main">
-  <p:cSld>
-    <p:spTree>
-      <p:nvGrpSpPr>
-        <p:cNvPr id="1" name=""/>
-        <p:cNvGrpSpPr/>
-        <p:nvPr/>
-      </p:nvGrpSpPr>
-      <p:grpSpPr>
-        <a:xfrm>
-          <a:off x="0" y="0"/>
-          <a:ext cx="0" cy="0"/>
-          <a:chOff x="0" y="0"/>
-          <a:chExt cx="0" cy="0"/>
-        </a:xfrm>
-      </p:grpSpPr>
-      <p:pic>
-        <p:nvPicPr>
-          <p:cNvPr descr="/Users/alison/rprojs/rmd-render-factory/gallery/outputs/slides/powerpoint_presentation_files/figure-pptx/unnamed-chunk-2-1.png" id="0" name="Picture 1"/>
-          <p:cNvPicPr>
-            <a:picLocks noGrp="1" noChangeAspect="1"/>
-          </p:cNvPicPr>
-          <p:nvPr/>
-        </p:nvPicPr>
-        <p:blipFill>
-          <a:blip r:embed="rId2"/>
-          <a:stretch>
-            <a:fillRect/>
-          </a:stretch>
-        </p:blipFill>
-        <p:spPr bwMode="auto">
-          <a:xfrm>
-            <a:off x="1752600" y="1600200"/>
-            <a:ext cx="5651500" cy="4521200"/>
-          </a:xfrm>
-          <a:prstGeom prst="rect">
-            <a:avLst/>
-          </a:prstGeom>
-          <a:noFill/>
-          <a:ln w="9525">
-            <a:noFill/>
-            <a:headEnd/>
-            <a:tailEnd/>
-          </a:ln>
-        </p:spPr>
-      </p:pic>
-    </p:spTree>
-  </p:cSld>
-</p:sld>
-</file>
-
-<file path=ppt/slides/slide5.xml><?xml version="1.0" encoding="utf-8"?>
-<p:sld xmlns:a="http://schemas.openxmlformats.org/drawingml/2006/main" xmlns:r="http://schemas.openxmlformats.org/officeDocument/2006/relationships" xmlns:p="http://schemas.openxmlformats.org/presentationml/2006/main">
-  <p:cSld>
-    <p:spTree>
-      <p:nvGrpSpPr>
-        <p:cNvPr id="1" name=""/>
-        <p:cNvGrpSpPr/>
-        <p:nvPr/>
-      </p:nvGrpSpPr>
-      <p:grpSpPr>
-        <a:xfrm>
-          <a:off x="0" y="0"/>
-          <a:ext cx="0" cy="0"/>
-          <a:chOff x="0" y="0"/>
-          <a:chExt cx="0" cy="0"/>
-        </a:xfrm>
-      </p:grpSpPr>
-      <p:sp>
-        <p:nvSpPr>
-          <p:cNvPr id="2" name="Title 1"/>
-          <p:cNvSpPr>
-            <a:spLocks noGrp="1"/>
-          </p:cNvSpPr>
-          <p:nvPr>
-            <p:ph type="title"/>
-          </p:nvPr>
-        </p:nvSpPr>
-        <p:spPr/>
-        <p:txBody>
-          <a:bodyPr/>
-          <a:lstStyle/>
-          <a:p>
-            <a:pPr lvl="0" marL="0" indent="0">
-              <a:buNone/>
-            </a:pPr>
-            <a:r>
-              <a:rPr/>
-              <a:t>Austin</a:t>
-            </a:r>
-            <a:r>
-              <a:rPr/>
-              <a:t> </a:t>
-            </a:r>
-            <a:r>
-              <a:rPr/>
-              <a:t>prices</a:t>
-            </a:r>
-            <a:r>
-              <a:rPr/>
-              <a:t> </a:t>
-            </a:r>
-            <a:r>
-              <a:rPr/>
-              <a:t>on</a:t>
-            </a:r>
-            <a:r>
-              <a:rPr/>
-              <a:t> </a:t>
-            </a:r>
-            <a:r>
-              <a:rPr/>
-              <a:t>the</a:t>
-            </a:r>
-            <a:r>
-              <a:rPr/>
-              <a:t> </a:t>
-            </a:r>
-            <a:r>
-              <a:rPr/>
-              <a:t>rise</a:t>
-            </a:r>
-          </a:p>
-        </p:txBody>
-      </p:sp>
-      <p:sp>
-        <p:nvSpPr>
-          <p:cNvPr id="3" name="Content Placeholder 2"/>
-          <p:cNvSpPr>
-            <a:spLocks noGrp="1"/>
-          </p:cNvSpPr>
-          <p:nvPr>
-            <p:ph idx="1"/>
-          </p:nvPr>
-        </p:nvSpPr>
-        <p:spPr/>
-        <p:txBody>
-          <a:bodyPr/>
-          <a:lstStyle/>
-          <a:p>
-            <a:pPr lvl="0" marL="1270000" indent="0">
-              <a:buNone/>
-            </a:pPr>
-            <a:r>
-              <a:rPr sz="1800" b="1">
-                <a:solidFill>
-                  <a:srgbClr val="007020"/>
-                </a:solidFill>
-                <a:latin typeface="Courier"/>
-              </a:rPr>
-              <a:t>ggplot</a:t>
-            </a:r>
-            <a:r>
-              <a:rPr sz="1800">
-                <a:latin typeface="Courier"/>
-              </a:rPr>
-              <a:t>(</a:t>
-            </a:r>
-            <a:r>
-              <a:rPr sz="1800">
-                <a:solidFill>
-                  <a:srgbClr val="902000"/>
-                </a:solidFill>
-                <a:latin typeface="Courier"/>
-              </a:rPr>
-              <a:t>data =</a:t>
-            </a:r>
-            <a:r>
-              <a:rPr sz="1800">
-                <a:latin typeface="Courier"/>
-              </a:rPr>
-              <a:t> </a:t>
-            </a:r>
-            <a:r>
-              <a:rPr sz="1800" b="1">
-                <a:solidFill>
-                  <a:srgbClr val="007020"/>
-                </a:solidFill>
-                <a:latin typeface="Courier"/>
-              </a:rPr>
-              <a:t>filter</a:t>
-            </a:r>
-            <a:r>
-              <a:rPr sz="1800">
-                <a:latin typeface="Courier"/>
-              </a:rPr>
-              <a:t>(txsamp, city </a:t>
-            </a:r>
-            <a:r>
-              <a:rPr sz="1800">
-                <a:solidFill>
-                  <a:srgbClr val="666666"/>
-                </a:solidFill>
-                <a:latin typeface="Courier"/>
-              </a:rPr>
-              <a:t>==</a:t>
-            </a:r>
-            <a:r>
-              <a:rPr sz="1800">
-                <a:solidFill>
-                  <a:srgbClr val="4070A0"/>
-                </a:solidFill>
-                <a:latin typeface="Courier"/>
-              </a:rPr>
-              <a:t> "Austin"</a:t>
-            </a:r>
-            <a:r>
-              <a:rPr sz="1800">
-                <a:latin typeface="Courier"/>
-              </a:rPr>
-              <a:t>), </a:t>
-            </a:r>
-            <a:r>
-              <a:rPr sz="1800" b="1">
-                <a:solidFill>
-                  <a:srgbClr val="007020"/>
-                </a:solidFill>
-                <a:latin typeface="Courier"/>
-              </a:rPr>
-              <a:t>aes</a:t>
-            </a:r>
-            <a:r>
-              <a:rPr sz="1800">
-                <a:latin typeface="Courier"/>
-              </a:rPr>
-              <a:t>(</a:t>
-            </a:r>
-            <a:r>
-              <a:rPr sz="1800">
-                <a:solidFill>
-                  <a:srgbClr val="902000"/>
-                </a:solidFill>
-                <a:latin typeface="Courier"/>
-              </a:rPr>
-              <a:t>x =</a:t>
-            </a:r>
-            <a:r>
-              <a:rPr sz="1800">
-                <a:latin typeface="Courier"/>
-              </a:rPr>
-              <a:t> sales, </a:t>
-            </a:r>
-            <a:r>
-              <a:rPr sz="1800">
-                <a:solidFill>
-                  <a:srgbClr val="902000"/>
-                </a:solidFill>
-                <a:latin typeface="Courier"/>
-              </a:rPr>
-              <a:t>y =</a:t>
-            </a:r>
-            <a:r>
-              <a:rPr sz="1800">
-                <a:latin typeface="Courier"/>
-              </a:rPr>
-              <a:t> median)) </a:t>
-            </a:r>
-            <a:r>
-              <a:rPr sz="1800">
-                <a:solidFill>
-                  <a:srgbClr val="666666"/>
-                </a:solidFill>
-                <a:latin typeface="Courier"/>
-              </a:rPr>
-              <a:t>+</a:t>
-            </a:r>
-            <a:br/>
-            <a:r>
-              <a:rPr sz="1800">
-                <a:solidFill>
-                  <a:srgbClr val="4070A0"/>
-                </a:solidFill>
-                <a:latin typeface="Courier"/>
-              </a:rPr>
-              <a:t>   </a:t>
-            </a:r>
-            <a:r>
-              <a:rPr sz="1800" b="1">
-                <a:solidFill>
-                  <a:srgbClr val="007020"/>
-                </a:solidFill>
-                <a:latin typeface="Courier"/>
-              </a:rPr>
-              <a:t>geom_point</a:t>
-            </a:r>
-            <a:r>
-              <a:rPr sz="1800">
-                <a:latin typeface="Courier"/>
-              </a:rPr>
-              <a:t>(</a:t>
-            </a:r>
-            <a:r>
-              <a:rPr sz="1800" b="1">
-                <a:solidFill>
-                  <a:srgbClr val="007020"/>
-                </a:solidFill>
-                <a:latin typeface="Courier"/>
-              </a:rPr>
-              <a:t>aes</a:t>
-            </a:r>
-            <a:r>
-              <a:rPr sz="1800">
-                <a:latin typeface="Courier"/>
-              </a:rPr>
-              <a:t>(</a:t>
-            </a:r>
-            <a:r>
-              <a:rPr sz="1800">
-                <a:solidFill>
-                  <a:srgbClr val="902000"/>
-                </a:solidFill>
-                <a:latin typeface="Courier"/>
-              </a:rPr>
-              <a:t>colour =</a:t>
-            </a:r>
-            <a:r>
-              <a:rPr sz="1800">
-                <a:latin typeface="Courier"/>
-              </a:rPr>
-              <a:t> year)) </a:t>
-            </a:r>
-            <a:r>
-              <a:rPr sz="1800">
-                <a:solidFill>
-                  <a:srgbClr val="666666"/>
-                </a:solidFill>
-                <a:latin typeface="Courier"/>
-              </a:rPr>
-              <a:t>+</a:t>
-            </a:r>
-            <a:r>
-              <a:rPr sz="1800">
-                <a:solidFill>
-                  <a:srgbClr val="4070A0"/>
-                </a:solidFill>
-                <a:latin typeface="Courier"/>
-              </a:rPr>
-              <a:t> </a:t>
-            </a:r>
-            <a:br/>
-            <a:r>
-              <a:rPr sz="1800">
-                <a:solidFill>
-                  <a:srgbClr val="4070A0"/>
-                </a:solidFill>
-                <a:latin typeface="Courier"/>
-              </a:rPr>
-              <a:t>   </a:t>
-            </a:r>
-            <a:r>
-              <a:rPr sz="1800" b="1">
-                <a:solidFill>
-                  <a:srgbClr val="007020"/>
-                </a:solidFill>
-                <a:latin typeface="Courier"/>
-              </a:rPr>
-              <a:t>scale_colour_viridis_c</a:t>
-            </a:r>
-            <a:r>
-              <a:rPr sz="1800">
-                <a:latin typeface="Courier"/>
-              </a:rPr>
-              <a:t>(</a:t>
-            </a:r>
-            <a:r>
-              <a:rPr sz="1800">
-                <a:solidFill>
-                  <a:srgbClr val="4070A0"/>
-                </a:solidFill>
-                <a:latin typeface="Courier"/>
-              </a:rPr>
-              <a:t>"Austin by year"</a:t>
-            </a:r>
-            <a:r>
-              <a:rPr sz="1800">
-                <a:latin typeface="Courier"/>
-              </a:rPr>
-              <a:t>, </a:t>
-            </a:r>
-            <a:r>
-              <a:rPr sz="1800">
-                <a:solidFill>
-                  <a:srgbClr val="902000"/>
-                </a:solidFill>
-                <a:latin typeface="Courier"/>
-              </a:rPr>
-              <a:t>option =</a:t>
-            </a:r>
-            <a:r>
-              <a:rPr sz="1800">
-                <a:latin typeface="Courier"/>
-              </a:rPr>
-              <a:t> params</a:t>
-            </a:r>
-            <a:r>
-              <a:rPr sz="1800">
-                <a:solidFill>
-                  <a:srgbClr val="666666"/>
-                </a:solidFill>
-                <a:latin typeface="Courier"/>
-              </a:rPr>
-              <a:t>$</a:t>
-            </a:r>
-            <a:r>
-              <a:rPr sz="1800">
-                <a:latin typeface="Courier"/>
-              </a:rPr>
-              <a:t>viridis_palette, </a:t>
-            </a:r>
-            <a:r>
-              <a:rPr sz="1800">
-                <a:solidFill>
-                  <a:srgbClr val="902000"/>
-                </a:solidFill>
-                <a:latin typeface="Courier"/>
-              </a:rPr>
-              <a:t>direction =</a:t>
-            </a:r>
-            <a:r>
-              <a:rPr sz="1800">
-                <a:latin typeface="Courier"/>
-              </a:rPr>
-              <a:t> </a:t>
-            </a:r>
-            <a:r>
-              <a:rPr sz="1800">
-                <a:solidFill>
-                  <a:srgbClr val="40A070"/>
-                </a:solidFill>
-                <a:latin typeface="Courier"/>
-              </a:rPr>
-              <a:t>-1</a:t>
-            </a:r>
-            <a:r>
-              <a:rPr sz="1800">
-                <a:latin typeface="Courier"/>
-              </a:rPr>
-              <a:t>) </a:t>
-            </a:r>
-          </a:p>
-        </p:txBody>
-      </p:sp>
-    </p:spTree>
-  </p:cSld>
-</p:sld>
-</file>
-
-<file path=ppt/slides/slide6.xml><?xml version="1.0" encoding="utf-8"?>
-<p:sld xmlns:a="http://schemas.openxmlformats.org/drawingml/2006/main" xmlns:r="http://schemas.openxmlformats.org/officeDocument/2006/relationships" xmlns:p="http://schemas.openxmlformats.org/presentationml/2006/main">
-  <p:cSld>
-    <p:spTree>
-      <p:nvGrpSpPr>
-        <p:cNvPr id="1" name=""/>
-        <p:cNvGrpSpPr/>
-        <p:nvPr/>
-      </p:nvGrpSpPr>
-      <p:grpSpPr>
-        <a:xfrm>
-          <a:off x="0" y="0"/>
-          <a:ext cx="0" cy="0"/>
-          <a:chOff x="0" y="0"/>
-          <a:chExt cx="0" cy="0"/>
-        </a:xfrm>
-      </p:grpSpPr>
-      <p:pic>
-        <p:nvPicPr>
-          <p:cNvPr descr="/Users/alison/rprojs/rmd-render-factory/gallery/outputs/slides/powerpoint_presentation_files/figure-pptx/unnamed-chunk-3-1.png" id="0" name="Picture 1"/>
-          <p:cNvPicPr>
-            <a:picLocks noGrp="1" noChangeAspect="1"/>
-          </p:cNvPicPr>
-          <p:nvPr/>
-        </p:nvPicPr>
-        <p:blipFill>
-          <a:blip r:embed="rId2"/>
-          <a:stretch>
-            <a:fillRect/>
-          </a:stretch>
-        </p:blipFill>
-        <p:spPr bwMode="auto">
-          <a:xfrm>
-            <a:off x="1752600" y="1600200"/>
-            <a:ext cx="5651500" cy="4521200"/>
-          </a:xfrm>
-          <a:prstGeom prst="rect">
-            <a:avLst/>
-          </a:prstGeom>
-          <a:noFill/>
-          <a:ln w="9525">
-            <a:noFill/>
-            <a:headEnd/>
-            <a:tailEnd/>
-          </a:ln>
-        </p:spPr>
-      </p:pic>
-    </p:spTree>
-  </p:cSld>
-</p:sld>
-</file>
-
-<file path=ppt/slides/slide7.xml><?xml version="1.0" encoding="utf-8"?>
-<p:sld xmlns:a="http://schemas.openxmlformats.org/drawingml/2006/main" xmlns:r="http://schemas.openxmlformats.org/officeDocument/2006/relationships" xmlns:p="http://schemas.openxmlformats.org/presentationml/2006/main">
-  <p:cSld>
-    <p:spTree>
-      <p:nvGrpSpPr>
-        <p:cNvPr id="1" name=""/>
-        <p:cNvGrpSpPr/>
-        <p:nvPr/>
-      </p:nvGrpSpPr>
-      <p:grpSpPr>
-        <a:xfrm>
-          <a:off x="0" y="0"/>
-          <a:ext cx="0" cy="0"/>
-          <a:chOff x="0" y="0"/>
-          <a:chExt cx="0" cy="0"/>
-        </a:xfrm>
-      </p:grpSpPr>
-      <p:sp>
-        <p:nvSpPr>
-          <p:cNvPr id="2" name="Title 1"/>
-          <p:cNvSpPr>
-            <a:spLocks noGrp="1"/>
-          </p:cNvSpPr>
-          <p:nvPr>
-            <p:ph type="title"/>
-          </p:nvPr>
-        </p:nvSpPr>
-        <p:spPr/>
-        <p:txBody>
-          <a:bodyPr/>
-          <a:lstStyle/>
-          <a:p>
-            <a:pPr lvl="0" marL="0" indent="0">
-              <a:buNone/>
-            </a:pPr>
-            <a:r>
-              <a:rPr/>
-              <a:t>Fort</a:t>
-            </a:r>
-            <a:r>
-              <a:rPr/>
-              <a:t> </a:t>
-            </a:r>
-            <a:r>
-              <a:rPr/>
-              <a:t>Worth</a:t>
-            </a:r>
-            <a:r>
-              <a:rPr/>
-              <a:t> </a:t>
-            </a:r>
-            <a:r>
-              <a:rPr/>
-              <a:t>has</a:t>
-            </a:r>
-            <a:r>
-              <a:rPr/>
-              <a:t> </a:t>
-            </a:r>
-            <a:r>
-              <a:rPr/>
-              <a:t>more</a:t>
-            </a:r>
-            <a:r>
-              <a:rPr/>
-              <a:t> </a:t>
-            </a:r>
-            <a:r>
-              <a:rPr/>
-              <a:t>affordable</a:t>
-            </a:r>
-            <a:r>
-              <a:rPr/>
-              <a:t> </a:t>
-            </a:r>
-            <a:r>
-              <a:rPr/>
-              <a:t>housing</a:t>
-            </a:r>
-          </a:p>
-        </p:txBody>
-      </p:sp>
-      <p:sp>
-        <p:nvSpPr>
-          <p:cNvPr id="3" name="Content Placeholder 2"/>
-          <p:cNvSpPr>
-            <a:spLocks noGrp="1"/>
-          </p:cNvSpPr>
-          <p:nvPr>
-            <p:ph idx="1"/>
-          </p:nvPr>
-        </p:nvSpPr>
-        <p:spPr/>
-        <p:txBody>
-          <a:bodyPr/>
-          <a:lstStyle/>
-          <a:p>
-            <a:pPr lvl="0" marL="1270000" indent="0">
-              <a:buNone/>
-            </a:pPr>
-            <a:r>
-              <a:rPr sz="1800" b="1">
-                <a:solidFill>
-                  <a:srgbClr val="007020"/>
-                </a:solidFill>
-                <a:latin typeface="Courier"/>
-              </a:rPr>
-              <a:t>library</a:t>
-            </a:r>
-            <a:r>
-              <a:rPr sz="1800">
-                <a:latin typeface="Courier"/>
-              </a:rPr>
-              <a:t>(scales) </a:t>
-            </a:r>
-            <a:r>
-              <a:rPr sz="1800" i="1">
-                <a:solidFill>
-                  <a:srgbClr val="60A0B0"/>
-                </a:solidFill>
-                <a:latin typeface="Courier"/>
-              </a:rPr>
-              <a:t># to make y-axis in non-scientific notation</a:t>
-            </a:r>
-            <a:br/>
-            <a:r>
-              <a:rPr sz="1800" b="1">
-                <a:solidFill>
-                  <a:srgbClr val="007020"/>
-                </a:solidFill>
-                <a:latin typeface="Courier"/>
-              </a:rPr>
-              <a:t>ggplot</a:t>
-            </a:r>
-            <a:r>
-              <a:rPr sz="1800">
-                <a:latin typeface="Courier"/>
-              </a:rPr>
-              <a:t>(txsamp, </a:t>
-            </a:r>
-            <a:r>
-              <a:rPr sz="1800" b="1">
-                <a:solidFill>
-                  <a:srgbClr val="007020"/>
-                </a:solidFill>
-                <a:latin typeface="Courier"/>
-              </a:rPr>
-              <a:t>aes</a:t>
-            </a:r>
-            <a:r>
-              <a:rPr sz="1800">
-                <a:latin typeface="Courier"/>
-              </a:rPr>
-              <a:t>(</a:t>
-            </a:r>
-            <a:r>
-              <a:rPr sz="1800">
-                <a:solidFill>
-                  <a:srgbClr val="902000"/>
-                </a:solidFill>
-                <a:latin typeface="Courier"/>
-              </a:rPr>
-              <a:t>x =</a:t>
-            </a:r>
-            <a:r>
-              <a:rPr sz="1800">
-                <a:latin typeface="Courier"/>
-              </a:rPr>
-              <a:t> median, </a:t>
-            </a:r>
-            <a:r>
-              <a:rPr sz="1800">
-                <a:solidFill>
-                  <a:srgbClr val="902000"/>
-                </a:solidFill>
-                <a:latin typeface="Courier"/>
-              </a:rPr>
-              <a:t>fill =</a:t>
-            </a:r>
-            <a:r>
-              <a:rPr sz="1800">
-                <a:latin typeface="Courier"/>
-              </a:rPr>
-              <a:t> city)) </a:t>
-            </a:r>
-            <a:r>
-              <a:rPr sz="1800">
-                <a:solidFill>
-                  <a:srgbClr val="666666"/>
-                </a:solidFill>
-                <a:latin typeface="Courier"/>
-              </a:rPr>
-              <a:t>+</a:t>
-            </a:r>
-            <a:br/>
-            <a:r>
-              <a:rPr sz="1800">
-                <a:solidFill>
-                  <a:srgbClr val="4070A0"/>
-                </a:solidFill>
-                <a:latin typeface="Courier"/>
-              </a:rPr>
-              <a:t>  </a:t>
-            </a:r>
-            <a:r>
-              <a:rPr sz="1800" b="1">
-                <a:solidFill>
-                  <a:srgbClr val="007020"/>
-                </a:solidFill>
-                <a:latin typeface="Courier"/>
-              </a:rPr>
-              <a:t>geom_histogram</a:t>
-            </a:r>
-            <a:r>
-              <a:rPr sz="1800">
-                <a:latin typeface="Courier"/>
-              </a:rPr>
-              <a:t>(</a:t>
-            </a:r>
-            <a:r>
-              <a:rPr sz="1800" b="1">
-                <a:solidFill>
-                  <a:srgbClr val="007020"/>
-                </a:solidFill>
-                <a:latin typeface="Courier"/>
-              </a:rPr>
-              <a:t>aes</a:t>
-            </a:r>
-            <a:r>
-              <a:rPr sz="1800">
-                <a:latin typeface="Courier"/>
-              </a:rPr>
-              <a:t>(</a:t>
-            </a:r>
-            <a:r>
-              <a:rPr sz="1800">
-                <a:solidFill>
-                  <a:srgbClr val="902000"/>
-                </a:solidFill>
-                <a:latin typeface="Courier"/>
-              </a:rPr>
-              <a:t>weight =</a:t>
-            </a:r>
-            <a:r>
-              <a:rPr sz="1800">
-                <a:latin typeface="Courier"/>
-              </a:rPr>
-              <a:t> sales), </a:t>
-            </a:r>
-            <a:r>
-              <a:rPr sz="1800">
-                <a:solidFill>
-                  <a:srgbClr val="902000"/>
-                </a:solidFill>
-                <a:latin typeface="Courier"/>
-              </a:rPr>
-              <a:t>position =</a:t>
-            </a:r>
-            <a:r>
-              <a:rPr sz="1800">
-                <a:latin typeface="Courier"/>
-              </a:rPr>
-              <a:t> </a:t>
-            </a:r>
-            <a:r>
-              <a:rPr sz="1800">
-                <a:solidFill>
-                  <a:srgbClr val="4070A0"/>
-                </a:solidFill>
-                <a:latin typeface="Courier"/>
-              </a:rPr>
-              <a:t>"dodge"</a:t>
-            </a:r>
-            <a:r>
-              <a:rPr sz="1800">
-                <a:latin typeface="Courier"/>
-              </a:rPr>
-              <a:t>, </a:t>
-            </a:r>
-            <a:r>
-              <a:rPr sz="1800">
-                <a:solidFill>
-                  <a:srgbClr val="902000"/>
-                </a:solidFill>
-                <a:latin typeface="Courier"/>
-              </a:rPr>
-              <a:t>binwidth =</a:t>
-            </a:r>
-            <a:r>
-              <a:rPr sz="1800">
-                <a:latin typeface="Courier"/>
-              </a:rPr>
-              <a:t> </a:t>
-            </a:r>
-            <a:r>
-              <a:rPr sz="1800">
-                <a:solidFill>
-                  <a:srgbClr val="40A070"/>
-                </a:solidFill>
-                <a:latin typeface="Courier"/>
-              </a:rPr>
-              <a:t>15000</a:t>
-            </a:r>
-            <a:r>
-              <a:rPr sz="1800">
-                <a:latin typeface="Courier"/>
-              </a:rPr>
-              <a:t>) </a:t>
-            </a:r>
-            <a:r>
-              <a:rPr sz="1800">
-                <a:solidFill>
-                  <a:srgbClr val="666666"/>
-                </a:solidFill>
-                <a:latin typeface="Courier"/>
-              </a:rPr>
-              <a:t>+</a:t>
-            </a:r>
-            <a:br/>
-            <a:r>
-              <a:rPr sz="1800">
-                <a:solidFill>
-                  <a:srgbClr val="4070A0"/>
-                </a:solidFill>
-                <a:latin typeface="Courier"/>
-              </a:rPr>
-              <a:t>  </a:t>
-            </a:r>
-            <a:r>
-              <a:rPr sz="1800" b="1">
-                <a:solidFill>
-                  <a:srgbClr val="007020"/>
-                </a:solidFill>
-                <a:latin typeface="Courier"/>
-              </a:rPr>
-              <a:t>scale_fill_viridis_d</a:t>
-            </a:r>
-            <a:r>
-              <a:rPr sz="1800">
-                <a:latin typeface="Courier"/>
-              </a:rPr>
-              <a:t>(</a:t>
-            </a:r>
-            <a:r>
-              <a:rPr sz="1800">
-                <a:solidFill>
-                  <a:srgbClr val="902000"/>
-                </a:solidFill>
-                <a:latin typeface="Courier"/>
-              </a:rPr>
-              <a:t>option =</a:t>
-            </a:r>
-            <a:r>
-              <a:rPr sz="1800">
-                <a:latin typeface="Courier"/>
-              </a:rPr>
-              <a:t> params</a:t>
-            </a:r>
-            <a:r>
-              <a:rPr sz="1800">
-                <a:solidFill>
-                  <a:srgbClr val="666666"/>
-                </a:solidFill>
-                <a:latin typeface="Courier"/>
-              </a:rPr>
-              <a:t>$</a:t>
-            </a:r>
-            <a:r>
-              <a:rPr sz="1800">
-                <a:latin typeface="Courier"/>
-              </a:rPr>
-              <a:t>viridis_palette)</a:t>
-            </a:r>
-            <a:r>
-              <a:rPr sz="1800">
-                <a:solidFill>
-                  <a:srgbClr val="666666"/>
-                </a:solidFill>
-                <a:latin typeface="Courier"/>
-              </a:rPr>
-              <a:t>+</a:t>
-            </a:r>
-            <a:br/>
-            <a:r>
-              <a:rPr sz="1800">
-                <a:solidFill>
-                  <a:srgbClr val="4070A0"/>
-                </a:solidFill>
-                <a:latin typeface="Courier"/>
-              </a:rPr>
-              <a:t>  </a:t>
-            </a:r>
-            <a:r>
-              <a:rPr sz="1800" b="1">
-                <a:solidFill>
-                  <a:srgbClr val="007020"/>
-                </a:solidFill>
-                <a:latin typeface="Courier"/>
-              </a:rPr>
-              <a:t>scale_y_continuous</a:t>
-            </a:r>
-            <a:r>
-              <a:rPr sz="1800">
-                <a:latin typeface="Courier"/>
-              </a:rPr>
-              <a:t>(</a:t>
-            </a:r>
-            <a:r>
-              <a:rPr sz="1800">
-                <a:solidFill>
-                  <a:srgbClr val="902000"/>
-                </a:solidFill>
-                <a:latin typeface="Courier"/>
-              </a:rPr>
-              <a:t>labels =</a:t>
-            </a:r>
-            <a:r>
-              <a:rPr sz="1800">
-                <a:latin typeface="Courier"/>
-              </a:rPr>
-              <a:t> comma)</a:t>
-            </a:r>
-          </a:p>
-        </p:txBody>
-      </p:sp>
-    </p:spTree>
-  </p:cSld>
-</p:sld>
-</file>
-
 <file path=ppt/slides/slide8.xml><?xml version="1.0" encoding="utf-8"?>
 <p:sld xmlns:a="http://schemas.openxmlformats.org/drawingml/2006/main" xmlns:r="http://schemas.openxmlformats.org/officeDocument/2006/relationships" xmlns:p="http://schemas.openxmlformats.org/presentationml/2006/main">
   <p:cSld>
@@ -4984,58 +3835,6 @@
           <a:chExt cx="0" cy="0"/>
         </a:xfrm>
       </p:grpSpPr>
-      <p:pic>
-        <p:nvPicPr>
-          <p:cNvPr descr="/Users/alison/rprojs/rmd-render-factory/gallery/outputs/slides/powerpoint_presentation_files/figure-pptx/unnamed-chunk-4-1.png" id="0" name="Picture 1"/>
-          <p:cNvPicPr>
-            <a:picLocks noGrp="1" noChangeAspect="1"/>
-          </p:cNvPicPr>
-          <p:nvPr/>
-        </p:nvPicPr>
-        <p:blipFill>
-          <a:blip r:embed="rId2"/>
-          <a:stretch>
-            <a:fillRect/>
-          </a:stretch>
-        </p:blipFill>
-        <p:spPr bwMode="auto">
-          <a:xfrm>
-            <a:off x="1752600" y="1600200"/>
-            <a:ext cx="5651500" cy="4521200"/>
-          </a:xfrm>
-          <a:prstGeom prst="rect">
-            <a:avLst/>
-          </a:prstGeom>
-          <a:noFill/>
-          <a:ln w="9525">
-            <a:noFill/>
-            <a:headEnd/>
-            <a:tailEnd/>
-          </a:ln>
-        </p:spPr>
-      </p:pic>
-    </p:spTree>
-  </p:cSld>
-</p:sld>
-</file>
-
-<file path=ppt/slides/slide9.xml><?xml version="1.0" encoding="utf-8"?>
-<p:sld xmlns:a="http://schemas.openxmlformats.org/drawingml/2006/main" xmlns:r="http://schemas.openxmlformats.org/officeDocument/2006/relationships" xmlns:p="http://schemas.openxmlformats.org/presentationml/2006/main">
-  <p:cSld>
-    <p:spTree>
-      <p:nvGrpSpPr>
-        <p:cNvPr id="1" name=""/>
-        <p:cNvGrpSpPr/>
-        <p:nvPr/>
-      </p:nvGrpSpPr>
-      <p:grpSpPr>
-        <a:xfrm>
-          <a:off x="0" y="0"/>
-          <a:ext cx="0" cy="0"/>
-          <a:chOff x="0" y="0"/>
-          <a:chExt cx="0" cy="0"/>
-        </a:xfrm>
-      </p:grpSpPr>
       <p:sp>
         <p:nvSpPr>
           <p:cNvPr id="2" name="Title 1"/>
@@ -5056,7 +3855,7 @@
             </a:pPr>
             <a:r>
               <a:rPr/>
-              <a:t>The</a:t>
+              <a:t>Thanks</a:t>
             </a:r>
             <a:r>
               <a:rPr/>
@@ -5064,47 +3863,7 @@
             </a:r>
             <a:r>
               <a:rPr/>
-              <a:t>current</a:t>
-            </a:r>
-            <a:r>
-              <a:rPr/>
-              <a:t> </a:t>
-            </a:r>
-            <a:r>
-              <a:rPr/>
-              <a:t>pace</a:t>
-            </a:r>
-            <a:r>
-              <a:rPr/>
-              <a:t> </a:t>
-            </a:r>
-            <a:r>
-              <a:rPr/>
-              <a:t>of</a:t>
-            </a:r>
-            <a:r>
-              <a:rPr/>
-              <a:t> </a:t>
-            </a:r>
-            <a:r>
-              <a:rPr/>
-              <a:t>sales</a:t>
-            </a:r>
-            <a:r>
-              <a:rPr/>
-              <a:t> </a:t>
-            </a:r>
-            <a:r>
-              <a:rPr/>
-              <a:t>is</a:t>
-            </a:r>
-            <a:r>
-              <a:rPr/>
-              <a:t> </a:t>
-            </a:r>
-            <a:r>
-              <a:rPr/>
-              <a:t>fast</a:t>
+              <a:t>to…</a:t>
             </a:r>
           </a:p>
         </p:txBody>
@@ -5124,293 +3883,29 @@
           <a:bodyPr/>
           <a:lstStyle/>
           <a:p>
-            <a:pPr lvl="0" marL="0" indent="0">
-              <a:buNone/>
-            </a:pPr>
-            <a:r>
-              <a:rPr/>
-              <a:t>“Months inventory”: amount of time it would take to sell all current listings at current pace of sales.</a:t>
-            </a:r>
-          </a:p>
-          <a:p>
-            <a:pPr lvl="0" marL="1270000" indent="0">
-              <a:buNone/>
-            </a:pPr>
-            <a:r>
-              <a:rPr sz="1800" b="1">
-                <a:solidFill>
-                  <a:srgbClr val="007020"/>
-                </a:solidFill>
-                <a:latin typeface="Courier"/>
+            <a:pPr lvl="1"/>
+            <a:r>
+              <a:rPr/>
+              <a:t>Jennifer Thompson: </a:t>
+            </a:r>
+            <a:r>
+              <a:rPr>
+                <a:hlinkClick r:id="rId2"/>
               </a:rPr>
-              <a:t>ggplot</a:t>
-            </a:r>
-            <a:r>
-              <a:rPr sz="1800">
-                <a:latin typeface="Courier"/>
+              <a:t>https://github.com/jenniferthompson/ParamRmdExample</a:t>
+            </a:r>
+          </a:p>
+          <a:p>
+            <a:pPr lvl="1"/>
+            <a:r>
+              <a:rPr/>
+              <a:t>Garrett Grolemund: </a:t>
+            </a:r>
+            <a:r>
+              <a:rPr>
+                <a:hlinkClick r:id="rId3"/>
               </a:rPr>
-              <a:t>(</a:t>
-            </a:r>
-            <a:r>
-              <a:rPr sz="1800">
-                <a:solidFill>
-                  <a:srgbClr val="902000"/>
-                </a:solidFill>
-                <a:latin typeface="Courier"/>
-              </a:rPr>
-              <a:t>data =</a:t>
-            </a:r>
-            <a:r>
-              <a:rPr sz="1800">
-                <a:latin typeface="Courier"/>
-              </a:rPr>
-              <a:t> txsamp, </a:t>
-            </a:r>
-            <a:r>
-              <a:rPr sz="1800" b="1">
-                <a:solidFill>
-                  <a:srgbClr val="007020"/>
-                </a:solidFill>
-                <a:latin typeface="Courier"/>
-              </a:rPr>
-              <a:t>aes</a:t>
-            </a:r>
-            <a:r>
-              <a:rPr sz="1800">
-                <a:latin typeface="Courier"/>
-              </a:rPr>
-              <a:t>(</a:t>
-            </a:r>
-            <a:r>
-              <a:rPr sz="1800">
-                <a:solidFill>
-                  <a:srgbClr val="902000"/>
-                </a:solidFill>
-                <a:latin typeface="Courier"/>
-              </a:rPr>
-              <a:t>x =</a:t>
-            </a:r>
-            <a:r>
-              <a:rPr sz="1800">
-                <a:latin typeface="Courier"/>
-              </a:rPr>
-              <a:t> year, </a:t>
-            </a:r>
-            <a:r>
-              <a:rPr sz="1800">
-                <a:solidFill>
-                  <a:srgbClr val="902000"/>
-                </a:solidFill>
-                <a:latin typeface="Courier"/>
-              </a:rPr>
-              <a:t>y =</a:t>
-            </a:r>
-            <a:r>
-              <a:rPr sz="1800">
-                <a:latin typeface="Courier"/>
-              </a:rPr>
-              <a:t> inventory, </a:t>
-            </a:r>
-            <a:r>
-              <a:rPr sz="1800">
-                <a:solidFill>
-                  <a:srgbClr val="902000"/>
-                </a:solidFill>
-                <a:latin typeface="Courier"/>
-              </a:rPr>
-              <a:t>colour =</a:t>
-            </a:r>
-            <a:r>
-              <a:rPr sz="1800">
-                <a:latin typeface="Courier"/>
-              </a:rPr>
-              <a:t> city)) </a:t>
-            </a:r>
-            <a:r>
-              <a:rPr sz="1800">
-                <a:solidFill>
-                  <a:srgbClr val="666666"/>
-                </a:solidFill>
-                <a:latin typeface="Courier"/>
-              </a:rPr>
-              <a:t>+</a:t>
-            </a:r>
-            <a:br/>
-            <a:r>
-              <a:rPr sz="1800">
-                <a:solidFill>
-                  <a:srgbClr val="4070A0"/>
-                </a:solidFill>
-                <a:latin typeface="Courier"/>
-              </a:rPr>
-              <a:t>  </a:t>
-            </a:r>
-            <a:r>
-              <a:rPr sz="1800" b="1">
-                <a:solidFill>
-                  <a:srgbClr val="007020"/>
-                </a:solidFill>
-                <a:latin typeface="Courier"/>
-              </a:rPr>
-              <a:t>geom_point</a:t>
-            </a:r>
-            <a:r>
-              <a:rPr sz="1800">
-                <a:latin typeface="Courier"/>
-              </a:rPr>
-              <a:t>() </a:t>
-            </a:r>
-            <a:r>
-              <a:rPr sz="1800">
-                <a:solidFill>
-                  <a:srgbClr val="666666"/>
-                </a:solidFill>
-                <a:latin typeface="Courier"/>
-              </a:rPr>
-              <a:t>+</a:t>
-            </a:r>
-            <a:r>
-              <a:rPr sz="1800">
-                <a:solidFill>
-                  <a:srgbClr val="4070A0"/>
-                </a:solidFill>
-                <a:latin typeface="Courier"/>
-              </a:rPr>
-              <a:t> </a:t>
-            </a:r>
-            <a:br/>
-            <a:r>
-              <a:rPr sz="1800">
-                <a:solidFill>
-                  <a:srgbClr val="4070A0"/>
-                </a:solidFill>
-                <a:latin typeface="Courier"/>
-              </a:rPr>
-              <a:t>  </a:t>
-            </a:r>
-            <a:r>
-              <a:rPr sz="1800" b="1">
-                <a:solidFill>
-                  <a:srgbClr val="007020"/>
-                </a:solidFill>
-                <a:latin typeface="Courier"/>
-              </a:rPr>
-              <a:t>geom_smooth</a:t>
-            </a:r>
-            <a:r>
-              <a:rPr sz="1800">
-                <a:latin typeface="Courier"/>
-              </a:rPr>
-              <a:t>(</a:t>
-            </a:r>
-            <a:r>
-              <a:rPr sz="1800">
-                <a:solidFill>
-                  <a:srgbClr val="902000"/>
-                </a:solidFill>
-                <a:latin typeface="Courier"/>
-              </a:rPr>
-              <a:t>se =</a:t>
-            </a:r>
-            <a:r>
-              <a:rPr sz="1800">
-                <a:latin typeface="Courier"/>
-              </a:rPr>
-              <a:t> </a:t>
-            </a:r>
-            <a:r>
-              <a:rPr sz="1800">
-                <a:solidFill>
-                  <a:srgbClr val="007020"/>
-                </a:solidFill>
-                <a:latin typeface="Courier"/>
-              </a:rPr>
-              <a:t>FALSE</a:t>
-            </a:r>
-            <a:r>
-              <a:rPr sz="1800">
-                <a:latin typeface="Courier"/>
-              </a:rPr>
-              <a:t>) </a:t>
-            </a:r>
-            <a:r>
-              <a:rPr sz="1800">
-                <a:solidFill>
-                  <a:srgbClr val="666666"/>
-                </a:solidFill>
-                <a:latin typeface="Courier"/>
-              </a:rPr>
-              <a:t>+</a:t>
-            </a:r>
-            <a:br/>
-            <a:r>
-              <a:rPr sz="1800">
-                <a:solidFill>
-                  <a:srgbClr val="4070A0"/>
-                </a:solidFill>
-                <a:latin typeface="Courier"/>
-              </a:rPr>
-              <a:t>  </a:t>
-            </a:r>
-            <a:r>
-              <a:rPr sz="1800" b="1">
-                <a:solidFill>
-                  <a:srgbClr val="007020"/>
-                </a:solidFill>
-                <a:latin typeface="Courier"/>
-              </a:rPr>
-              <a:t>scale_colour_viridis_d</a:t>
-            </a:r>
-            <a:r>
-              <a:rPr sz="1800">
-                <a:latin typeface="Courier"/>
-              </a:rPr>
-              <a:t>(</a:t>
-            </a:r>
-            <a:r>
-              <a:rPr sz="1800">
-                <a:solidFill>
-                  <a:srgbClr val="4070A0"/>
-                </a:solidFill>
-                <a:latin typeface="Courier"/>
-              </a:rPr>
-              <a:t>"City\nCenter"</a:t>
-            </a:r>
-            <a:r>
-              <a:rPr sz="1800">
-                <a:latin typeface="Courier"/>
-              </a:rPr>
-              <a:t>, </a:t>
-            </a:r>
-            <a:r>
-              <a:rPr sz="1800">
-                <a:solidFill>
-                  <a:srgbClr val="902000"/>
-                </a:solidFill>
-                <a:latin typeface="Courier"/>
-              </a:rPr>
-              <a:t>option =</a:t>
-            </a:r>
-            <a:r>
-              <a:rPr sz="1800">
-                <a:latin typeface="Courier"/>
-              </a:rPr>
-              <a:t> params</a:t>
-            </a:r>
-            <a:r>
-              <a:rPr sz="1800">
-                <a:solidFill>
-                  <a:srgbClr val="666666"/>
-                </a:solidFill>
-                <a:latin typeface="Courier"/>
-              </a:rPr>
-              <a:t>$</a:t>
-            </a:r>
-            <a:r>
-              <a:rPr sz="1800">
-                <a:latin typeface="Courier"/>
-              </a:rPr>
-              <a:t>viridis_palette) </a:t>
+              <a:t>https://rmarkdown.rstudio.com/lesson-6.html</a:t>
             </a:r>
           </a:p>
         </p:txBody>

</xml_diff>